<commit_message>
Poster com foto em ajustes
</commit_message>
<xml_diff>
--- a/PROJETO alarme meta - Gustavo_Bruno/Template-Poster-META-2023.pptx
+++ b/PROJETO alarme meta - Gustavo_Bruno/Template-Poster-META-2023.pptx
@@ -257,7 +257,7 @@
       </p15:sldGuideLst>
     </p:ext>
     <p:ext uri="GoogleSlidesCustomDataVersion2">
-      <go:slidesCustomData xmlns:go="http://customooxmlschemas.google.com/" r:id="rId7" roundtripDataSignature="AMtx7mjvBCxhhoJp2F7sfqeiJe3GlFB2RQ=="/>
+      <go:slidesCustomData xmlns:go="http://customooxmlschemas.google.com/" r:id="rId7" roundtripDataSignature="AMtx7miG6nfin/T1r/vWsOYuF3FEywzniw=="/>
     </p:ext>
   </p:extLst>
 </p:presentation>
@@ -7366,6 +7366,69 @@
         </p:nvSpPr>
         <p:spPr>
           <a:xfrm>
+            <a:off x="14766300" y="37570022"/>
+            <a:ext cx="13319700" cy="3784200"/>
+          </a:xfrm>
+          <a:prstGeom prst="rect">
+            <a:avLst/>
+          </a:prstGeom>
+          <a:noFill/>
+          <a:ln>
+            <a:noFill/>
+          </a:ln>
+        </p:spPr>
+        <p:txBody>
+          <a:bodyPr anchorCtr="0" anchor="t" bIns="45000" lIns="90000" spcFirstLastPara="1" rIns="90000" wrap="square" tIns="45000">
+            <a:spAutoFit/>
+          </a:bodyPr>
+          <a:lstStyle/>
+          <a:p>
+            <a:pPr indent="0" lvl="0" marL="0" marR="0" rtl="0" algn="just">
+              <a:lnSpc>
+                <a:spcPct val="100000"/>
+              </a:lnSpc>
+              <a:spcBef>
+                <a:spcPts val="0"/>
+              </a:spcBef>
+              <a:spcAft>
+                <a:spcPts val="0"/>
+              </a:spcAft>
+              <a:buNone/>
+            </a:pPr>
+            <a:r>
+              <a:rPr lang="pt-BR" sz="4000"/>
+              <a:t>Getting Started with Blynk. Disponível em: https://examples.blynk.cc/?board=ESP8266&amp;shield=ESP8266%20WiFi&amp;example=GettingStarted%2FBlynkBlink. Acesso em: 16 ago. 2023.</a:t>
+            </a:r>
+            <a:endParaRPr sz="4000"/>
+          </a:p>
+          <a:p>
+            <a:pPr indent="0" lvl="0" marL="0" marR="0" rtl="0" algn="just">
+              <a:lnSpc>
+                <a:spcPct val="100000"/>
+              </a:lnSpc>
+              <a:spcBef>
+                <a:spcPts val="0"/>
+              </a:spcBef>
+              <a:spcAft>
+                <a:spcPts val="0"/>
+              </a:spcAft>
+              <a:buNone/>
+            </a:pPr>
+            <a:r>
+              <a:t/>
+            </a:r>
+            <a:endParaRPr sz="4000"/>
+          </a:p>
+        </p:txBody>
+      </p:sp>
+      <p:sp>
+        <p:nvSpPr>
+          <p:cNvPr id="64" name="Google Shape;64;p1"/>
+          <p:cNvSpPr/>
+          <p:nvPr/>
+        </p:nvSpPr>
+        <p:spPr>
+          <a:xfrm>
             <a:off x="3143122" y="6722183"/>
             <a:ext cx="22546469" cy="1752872"/>
           </a:xfrm>
@@ -7418,7 +7481,7 @@
       </p:sp>
       <p:sp>
         <p:nvSpPr>
-          <p:cNvPr id="64" name="Google Shape;64;p1"/>
+          <p:cNvPr id="65" name="Google Shape;65;p1"/>
           <p:cNvSpPr/>
           <p:nvPr/>
         </p:nvSpPr>
@@ -7503,7 +7566,7 @@
       </p:sp>
       <p:sp>
         <p:nvSpPr>
-          <p:cNvPr id="65" name="Google Shape;65;p1"/>
+          <p:cNvPr id="66" name="Google Shape;66;p1"/>
           <p:cNvSpPr/>
           <p:nvPr/>
         </p:nvSpPr>
@@ -7566,14 +7629,14 @@
       </p:sp>
       <p:sp>
         <p:nvSpPr>
-          <p:cNvPr id="66" name="Google Shape;66;p1"/>
+          <p:cNvPr id="67" name="Google Shape;67;p1"/>
           <p:cNvSpPr/>
           <p:nvPr/>
         </p:nvSpPr>
         <p:spPr>
           <a:xfrm>
-            <a:off x="576000" y="17939124"/>
-            <a:ext cx="13319640" cy="921876"/>
+            <a:off x="576000" y="16550524"/>
+            <a:ext cx="13319700" cy="921900"/>
           </a:xfrm>
           <a:prstGeom prst="rect">
             <a:avLst/>
@@ -7629,14 +7692,14 @@
       </p:sp>
       <p:sp>
         <p:nvSpPr>
-          <p:cNvPr id="67" name="Google Shape;67;p1"/>
+          <p:cNvPr id="68" name="Google Shape;68;p1"/>
           <p:cNvSpPr/>
           <p:nvPr/>
         </p:nvSpPr>
         <p:spPr>
           <a:xfrm>
-            <a:off x="519056" y="26241824"/>
-            <a:ext cx="13319640" cy="921876"/>
+            <a:off x="575943" y="24037224"/>
+            <a:ext cx="13319700" cy="921900"/>
           </a:xfrm>
           <a:prstGeom prst="rect">
             <a:avLst/>
@@ -7692,7 +7755,7 @@
       </p:sp>
       <p:sp>
         <p:nvSpPr>
-          <p:cNvPr id="68" name="Google Shape;68;p1"/>
+          <p:cNvPr id="69" name="Google Shape;69;p1"/>
           <p:cNvSpPr/>
           <p:nvPr/>
         </p:nvSpPr>
@@ -7755,14 +7818,14 @@
       </p:sp>
       <p:sp>
         <p:nvSpPr>
-          <p:cNvPr id="69" name="Google Shape;69;p1"/>
+          <p:cNvPr id="70" name="Google Shape;70;p1"/>
           <p:cNvSpPr/>
           <p:nvPr/>
         </p:nvSpPr>
         <p:spPr>
           <a:xfrm>
-            <a:off x="14766265" y="29148707"/>
-            <a:ext cx="13319640" cy="921876"/>
+            <a:off x="14766265" y="26241832"/>
+            <a:ext cx="13319700" cy="921900"/>
           </a:xfrm>
           <a:prstGeom prst="rect">
             <a:avLst/>
@@ -7818,14 +7881,14 @@
       </p:sp>
       <p:sp>
         <p:nvSpPr>
-          <p:cNvPr id="70" name="Google Shape;70;p1"/>
+          <p:cNvPr id="71" name="Google Shape;71;p1"/>
           <p:cNvSpPr/>
           <p:nvPr/>
         </p:nvSpPr>
         <p:spPr>
           <a:xfrm>
-            <a:off x="14758950" y="35293562"/>
-            <a:ext cx="13319640" cy="921876"/>
+            <a:off x="14759800" y="36360362"/>
+            <a:ext cx="13319700" cy="921900"/>
           </a:xfrm>
           <a:prstGeom prst="rect">
             <a:avLst/>
@@ -7881,14 +7944,14 @@
       </p:sp>
       <p:sp>
         <p:nvSpPr>
-          <p:cNvPr id="71" name="Google Shape;71;p1"/>
+          <p:cNvPr id="72" name="Google Shape;72;p1"/>
           <p:cNvSpPr/>
           <p:nvPr/>
         </p:nvSpPr>
         <p:spPr>
           <a:xfrm>
-            <a:off x="576000" y="11743493"/>
-            <a:ext cx="13319640" cy="5015304"/>
+            <a:off x="576000" y="11455268"/>
+            <a:ext cx="13319700" cy="5015400"/>
           </a:xfrm>
           <a:prstGeom prst="rect">
             <a:avLst/>
@@ -7917,39 +7980,36 @@
               <a:buNone/>
             </a:pPr>
             <a:r>
-              <a:rPr b="0" i="0" lang="pt-BR" sz="4000" u="none" cap="none" strike="noStrike">
-                <a:solidFill>
-                  <a:srgbClr val="000000"/>
-                </a:solidFill>
-                <a:latin typeface="Arial"/>
-                <a:ea typeface="Arial"/>
-                <a:cs typeface="Arial"/>
-                <a:sym typeface="Arial"/>
+              <a:rPr lang="pt-BR" sz="4000">
+                <a:latin typeface="Verdana"/>
+                <a:ea typeface="Verdana"/>
+                <a:cs typeface="Verdana"/>
+                <a:sym typeface="Verdana"/>
               </a:rPr>
-              <a:t>A preocupação com a segurança é algo frequente na vida dos brasileiros, pensando nisso, e muito comum a utilização de dispositivos de segurança, como cercas elétricas, alarmes, etc. Entretanto, muitos destes dispositivos tem um custo alto, seja do produto ou de sua instalação, por isso, muitas casas não possuem esses recursos, pois seus proprietários se recusam a investir nisso.</a:t>
+              <a:t>A preocupação com a segurança é algo frequente na vida dos brasileiros, pensando nisso, é muito comum a utilização de dispositivos de segurança como cercas elétricas, câmeras, alarmes, etc. Entretanto, muitos destes dispositivos tem custo alto, seja do produto ou para sua instalação, desincentivando o proprietário a adquiri-lo.</a:t>
             </a:r>
-            <a:endParaRPr b="0" i="0" sz="4000" u="none" cap="none" strike="noStrike">
+            <a:endParaRPr i="0" sz="4000" u="none" cap="none" strike="noStrike">
               <a:solidFill>
                 <a:schemeClr val="dk1"/>
               </a:solidFill>
-              <a:latin typeface="Arial"/>
-              <a:ea typeface="Arial"/>
-              <a:cs typeface="Arial"/>
-              <a:sym typeface="Arial"/>
+              <a:latin typeface="Verdana"/>
+              <a:ea typeface="Verdana"/>
+              <a:cs typeface="Verdana"/>
+              <a:sym typeface="Verdana"/>
             </a:endParaRPr>
           </a:p>
         </p:txBody>
       </p:sp>
       <p:sp>
         <p:nvSpPr>
-          <p:cNvPr id="72" name="Google Shape;72;p1"/>
+          <p:cNvPr id="73" name="Google Shape;73;p1"/>
           <p:cNvSpPr/>
           <p:nvPr/>
         </p:nvSpPr>
         <p:spPr>
           <a:xfrm>
-            <a:off x="519056" y="19450794"/>
-            <a:ext cx="13349160" cy="5415413"/>
+            <a:off x="561243" y="17729757"/>
+            <a:ext cx="13349100" cy="5415300"/>
           </a:xfrm>
           <a:prstGeom prst="rect">
             <a:avLst/>
@@ -7978,51 +8038,39 @@
               <a:buNone/>
             </a:pPr>
             <a:r>
-              <a:rPr b="0" i="0" lang="pt-BR" sz="4000" u="none" cap="none" strike="noStrike">
+              <a:rPr lang="pt-BR" sz="4000">
                 <a:solidFill>
                   <a:schemeClr val="dk1"/>
-                </a:solidFill>
-                <a:latin typeface="Arial"/>
-                <a:ea typeface="Arial"/>
-                <a:cs typeface="Arial"/>
-                <a:sym typeface="Arial"/>
-              </a:rPr>
-              <a:t>O objetivo desse projeto é desenvolver um dispositivo de segurança de baixo custo, capaz de avisar caso haja algum intruso em um ambiente. Além disso, o projeto incentiva a aprendizagem e o uso do arduíno, atividade capaz de inspirar o público a buscar conhecer sobre essa ferramenta, que pode resolver grandes problemas através da programação, sendo uma solução barata e fácil de ser implementada.</a:t>
-            </a:r>
-            <a:r>
-              <a:rPr b="0" i="0" lang="pt-BR" sz="6000" u="none" cap="none" strike="noStrike">
-                <a:solidFill>
-                  <a:srgbClr val="000000"/>
                 </a:solidFill>
                 <a:latin typeface="Verdana"/>
                 <a:ea typeface="Verdana"/>
                 <a:cs typeface="Verdana"/>
                 <a:sym typeface="Verdana"/>
               </a:rPr>
-              <a:t> </a:t>
+              <a:t>O objetivo desse projeto é desenvolver um dispositivo de segurança de baixo custo, capaz de avisar caso haja algum intruso em um ambiente. Além disso, o projeto incentiva a familiaridade com os microcontroladores, inspirando o público a buscar conhecer sobre uma ferramenta que pode resolver grandes problemas através da automação, sendo uma solução barata e fácil de ser implementada.</a:t>
             </a:r>
-            <a:endParaRPr b="0" i="0" sz="6000" u="none" cap="none" strike="noStrike">
+            <a:endParaRPr i="0" sz="6000" u="none" cap="none" strike="noStrike">
               <a:solidFill>
                 <a:schemeClr val="dk1"/>
               </a:solidFill>
-              <a:latin typeface="Arial"/>
-              <a:ea typeface="Arial"/>
-              <a:cs typeface="Arial"/>
-              <a:sym typeface="Arial"/>
+              <a:latin typeface="Verdana"/>
+              <a:ea typeface="Verdana"/>
+              <a:cs typeface="Verdana"/>
+              <a:sym typeface="Verdana"/>
             </a:endParaRPr>
           </a:p>
         </p:txBody>
       </p:sp>
       <p:sp>
         <p:nvSpPr>
-          <p:cNvPr id="73" name="Google Shape;73;p1"/>
+          <p:cNvPr id="74" name="Google Shape;74;p1"/>
           <p:cNvSpPr/>
           <p:nvPr/>
         </p:nvSpPr>
         <p:spPr>
           <a:xfrm>
-            <a:off x="395171" y="27763561"/>
-            <a:ext cx="13319640" cy="6246410"/>
+            <a:off x="576000" y="25173225"/>
+            <a:ext cx="8885400" cy="4158900"/>
           </a:xfrm>
           <a:prstGeom prst="rect">
             <a:avLst/>
@@ -8051,39 +8099,42 @@
               <a:buNone/>
             </a:pPr>
             <a:r>
-              <a:rPr b="0" i="0" lang="pt-BR" sz="4000" u="none" cap="none" strike="noStrike">
-                <a:solidFill>
-                  <a:srgbClr val="000000"/>
-                </a:solidFill>
-                <a:latin typeface="Arial"/>
-                <a:ea typeface="Arial"/>
-                <a:cs typeface="Arial"/>
-                <a:sym typeface="Arial"/>
+              <a:rPr lang="pt-BR" sz="4000">
+                <a:latin typeface="Verdana"/>
+                <a:ea typeface="Verdana"/>
+                <a:cs typeface="Verdana"/>
+                <a:sym typeface="Verdana"/>
               </a:rPr>
-              <a:t>O sistema usa um Arduino esp32 com um sensor de movimento HC-SR501 PIR, teclado, display e alarme, que são conectados ao Arduino. O sensor detecta movimento e avisa o Arduino. Se alguém não digitar a senha após um intervalo de tempo, o sistema alerta um celular via aplicativo Blynk. Além disso, se a senha for digitada errada três vezes, o arduíno ativa o alarme e envia um aviso sobre possível intruso pelo Blynk. Se a senha estiver correta, apenas informa sobre a presença da pessoa, sem ativar o alarme.</a:t>
+              <a:t>O sistema usa o dispositivo ESP8266 com um sensor de movimento HC-SR501, teclado matricial, display e buzzer conectados a ele. O sensor detecta movimento e envia um sinal para o dispositivo. Se a</a:t>
             </a:r>
-            <a:endParaRPr b="0" i="0" sz="4000" u="none" cap="none" strike="noStrike">
-              <a:solidFill>
-                <a:schemeClr val="dk1"/>
-              </a:solidFill>
-              <a:latin typeface="Arial"/>
-              <a:ea typeface="Arial"/>
-              <a:cs typeface="Arial"/>
-              <a:sym typeface="Arial"/>
+            <a:r>
+              <a:rPr lang="pt-BR" sz="4000">
+                <a:latin typeface="Verdana"/>
+                <a:ea typeface="Verdana"/>
+                <a:cs typeface="Verdana"/>
+                <a:sym typeface="Verdana"/>
+              </a:rPr>
+              <a:t> pessoa</a:t>
+            </a:r>
+            <a:endParaRPr sz="4000">
+              <a:latin typeface="Verdana"/>
+              <a:ea typeface="Verdana"/>
+              <a:cs typeface="Verdana"/>
+              <a:sym typeface="Verdana"/>
             </a:endParaRPr>
           </a:p>
         </p:txBody>
       </p:sp>
       <p:sp>
         <p:nvSpPr>
-          <p:cNvPr id="74" name="Google Shape;74;p1"/>
+          <p:cNvPr id="75" name="Google Shape;75;p1"/>
           <p:cNvSpPr/>
           <p:nvPr/>
         </p:nvSpPr>
         <p:spPr>
           <a:xfrm>
-            <a:off x="14757535" y="19511933"/>
-            <a:ext cx="13319640" cy="5630857"/>
+            <a:off x="14766335" y="19207533"/>
+            <a:ext cx="13319700" cy="5631000"/>
           </a:xfrm>
           <a:prstGeom prst="rect">
             <a:avLst/>
@@ -8112,39 +8163,36 @@
               <a:buNone/>
             </a:pPr>
             <a:r>
-              <a:rPr b="0" i="0" lang="pt-BR" sz="4000" u="none" cap="none" strike="noStrike">
-                <a:solidFill>
-                  <a:srgbClr val="000000"/>
-                </a:solidFill>
-                <a:latin typeface="Arial"/>
-                <a:ea typeface="Arial"/>
-                <a:cs typeface="Arial"/>
-                <a:sym typeface="Arial"/>
+              <a:rPr lang="pt-BR" sz="4000">
+                <a:latin typeface="Verdana"/>
+                <a:ea typeface="Verdana"/>
+                <a:cs typeface="Verdana"/>
+                <a:sym typeface="Verdana"/>
               </a:rPr>
-              <a:t>Após todos os testes o dispositivo se mostrou eficiente e demonstrou o resultado esperado, pois o sensor utilizado conseguiu captar a presença de movimento com a distância e precisão requerida. Além disso o programa que foi desenvolvido conseguiu realizar todas as atividades propostas, detectando o movimento e enviando a mensagem para o aplicativo. Portanto, é possível atingir o resultado esperado, de se obter um dispositivo de segurança com baixo custo e bem otimizado.</a:t>
+              <a:t>Após todos os testes, o dispositivo se mostrou suficiente e eficiente para se chegar no resultado esperado. O sensor utilizado conseguiu captar a presença de movimento com a distância e precisão requerida, o processador foi suficiente para executar o software desenvolvido e a notificação foi corretamente entregue no celular do proprietário. O protótipo é capaz de contribui para a segurança de um ambiente monitorado mesmo sendo de baixo custo.</a:t>
             </a:r>
-            <a:endParaRPr b="0" i="0" sz="4000" u="none" cap="none" strike="noStrike">
+            <a:endParaRPr i="0" sz="4000" u="none" cap="none" strike="noStrike">
               <a:solidFill>
                 <a:schemeClr val="dk1"/>
               </a:solidFill>
-              <a:latin typeface="Arial"/>
-              <a:ea typeface="Arial"/>
-              <a:cs typeface="Arial"/>
-              <a:sym typeface="Arial"/>
+              <a:latin typeface="Verdana"/>
+              <a:ea typeface="Verdana"/>
+              <a:cs typeface="Verdana"/>
+              <a:sym typeface="Verdana"/>
             </a:endParaRPr>
           </a:p>
         </p:txBody>
       </p:sp>
       <p:sp>
         <p:nvSpPr>
-          <p:cNvPr id="75" name="Google Shape;75;p1"/>
+          <p:cNvPr id="76" name="Google Shape;76;p1"/>
           <p:cNvSpPr/>
           <p:nvPr/>
         </p:nvSpPr>
         <p:spPr>
           <a:xfrm>
-            <a:off x="14758950" y="30635162"/>
-            <a:ext cx="13319640" cy="3784198"/>
+            <a:off x="14757500" y="27403150"/>
+            <a:ext cx="13319700" cy="3784200"/>
           </a:xfrm>
           <a:prstGeom prst="rect">
             <a:avLst/>
@@ -8173,86 +8221,154 @@
               <a:buNone/>
             </a:pPr>
             <a:r>
-              <a:rPr b="0" i="0" lang="pt-BR" sz="4000" u="none" cap="none" strike="noStrike">
+              <a:rPr lang="pt-BR" sz="4000">
+                <a:latin typeface="Verdana"/>
+                <a:ea typeface="Verdana"/>
+                <a:cs typeface="Verdana"/>
+                <a:sym typeface="Verdana"/>
+              </a:rPr>
+              <a:t>Este projeto torna </a:t>
+            </a:r>
+            <a:r>
+              <a:rPr i="0" lang="pt-BR" sz="4000" u="none" cap="none" strike="noStrike">
                 <a:solidFill>
                   <a:srgbClr val="000000"/>
                 </a:solidFill>
-                <a:latin typeface="Arial"/>
-                <a:ea typeface="Arial"/>
-                <a:cs typeface="Arial"/>
-                <a:sym typeface="Arial"/>
+                <a:latin typeface="Verdana"/>
+                <a:ea typeface="Verdana"/>
+                <a:cs typeface="Verdana"/>
+                <a:sym typeface="Verdana"/>
               </a:rPr>
-              <a:t>Através da realização deste projeto, ficou claro o quão viável é a utilização de arduíno para resolver problemas que possam parecer difíceis. Além disso, vale reforçar que essa é uma plataforma interessante de se aprender, para fins profissionais ou até mesmo para realização de projetos individuais com fins pessoais.</a:t>
+              <a:t>claro o quão viável é a utilização de </a:t>
             </a:r>
-            <a:endParaRPr b="0" i="0" sz="4000" u="none" cap="none" strike="noStrike">
+            <a:r>
+              <a:rPr lang="pt-BR" sz="4000">
+                <a:latin typeface="Verdana"/>
+                <a:ea typeface="Verdana"/>
+                <a:cs typeface="Verdana"/>
+                <a:sym typeface="Verdana"/>
+              </a:rPr>
+              <a:t>microcontroladores </a:t>
+            </a:r>
+            <a:r>
+              <a:rPr i="0" lang="pt-BR" sz="4000" u="none" cap="none" strike="noStrike">
+                <a:solidFill>
+                  <a:srgbClr val="000000"/>
+                </a:solidFill>
+                <a:latin typeface="Verdana"/>
+                <a:ea typeface="Verdana"/>
+                <a:cs typeface="Verdana"/>
+                <a:sym typeface="Verdana"/>
+              </a:rPr>
+              <a:t>para resolver problemas que </a:t>
+            </a:r>
+            <a:r>
+              <a:rPr i="0" lang="pt-BR" sz="4000" u="none" cap="none" strike="noStrike">
+                <a:solidFill>
+                  <a:srgbClr val="000000"/>
+                </a:solidFill>
+                <a:latin typeface="Verdana"/>
+                <a:ea typeface="Verdana"/>
+                <a:cs typeface="Verdana"/>
+                <a:sym typeface="Verdana"/>
+              </a:rPr>
+              <a:t>possam parecer difíceis</a:t>
+            </a:r>
+            <a:r>
+              <a:rPr i="0" lang="pt-BR" sz="4000" u="none" cap="none" strike="noStrike">
+                <a:solidFill>
+                  <a:srgbClr val="000000"/>
+                </a:solidFill>
+                <a:latin typeface="Verdana"/>
+                <a:ea typeface="Verdana"/>
+                <a:cs typeface="Verdana"/>
+                <a:sym typeface="Verdana"/>
+              </a:rPr>
+              <a:t>. Além disso,</a:t>
+            </a:r>
+            <a:r>
+              <a:rPr lang="pt-BR" sz="4000">
+                <a:latin typeface="Verdana"/>
+                <a:ea typeface="Verdana"/>
+                <a:cs typeface="Verdana"/>
+                <a:sym typeface="Verdana"/>
+              </a:rPr>
+              <a:t> vale </a:t>
+            </a:r>
+            <a:r>
+              <a:rPr i="0" lang="pt-BR" sz="4000" u="none" cap="none" strike="noStrike">
+                <a:solidFill>
+                  <a:srgbClr val="000000"/>
+                </a:solidFill>
+                <a:latin typeface="Verdana"/>
+                <a:ea typeface="Verdana"/>
+                <a:cs typeface="Verdana"/>
+                <a:sym typeface="Verdana"/>
+              </a:rPr>
+              <a:t>reforçar que é </a:t>
+            </a:r>
+            <a:r>
+              <a:rPr lang="pt-BR" sz="4000">
+                <a:solidFill>
+                  <a:schemeClr val="dk1"/>
+                </a:solidFill>
+                <a:latin typeface="Verdana"/>
+                <a:ea typeface="Verdana"/>
+                <a:cs typeface="Verdana"/>
+                <a:sym typeface="Verdana"/>
+              </a:rPr>
+              <a:t>interessante </a:t>
+            </a:r>
+            <a:r>
+              <a:rPr lang="pt-BR" sz="4000">
+                <a:latin typeface="Verdana"/>
+                <a:ea typeface="Verdana"/>
+                <a:cs typeface="Verdana"/>
+                <a:sym typeface="Verdana"/>
+              </a:rPr>
+              <a:t>aprender a desenvolver projetos como esse</a:t>
+            </a:r>
+            <a:r>
+              <a:rPr i="0" lang="pt-BR" sz="4000" u="none" cap="none" strike="noStrike">
+                <a:solidFill>
+                  <a:srgbClr val="000000"/>
+                </a:solidFill>
+                <a:latin typeface="Verdana"/>
+                <a:ea typeface="Verdana"/>
+                <a:cs typeface="Verdana"/>
+                <a:sym typeface="Verdana"/>
+              </a:rPr>
+              <a:t>,</a:t>
+            </a:r>
+            <a:r>
+              <a:rPr lang="pt-BR" sz="4000">
+                <a:latin typeface="Verdana"/>
+                <a:ea typeface="Verdana"/>
+                <a:cs typeface="Verdana"/>
+                <a:sym typeface="Verdana"/>
+              </a:rPr>
+              <a:t> </a:t>
+            </a:r>
+            <a:r>
+              <a:rPr i="0" lang="pt-BR" sz="4000" u="none" cap="none" strike="noStrike">
+                <a:solidFill>
+                  <a:srgbClr val="000000"/>
+                </a:solidFill>
+                <a:latin typeface="Verdana"/>
+                <a:ea typeface="Verdana"/>
+                <a:cs typeface="Verdana"/>
+                <a:sym typeface="Verdana"/>
+              </a:rPr>
+              <a:t>para fins profissionais ou até mesmo para realização de projetos individuais com fins pessoais.</a:t>
+            </a:r>
+            <a:endParaRPr i="0" sz="4000" u="none" cap="none" strike="noStrike">
               <a:solidFill>
                 <a:srgbClr val="000000"/>
               </a:solidFill>
-              <a:latin typeface="Arial"/>
-              <a:ea typeface="Arial"/>
-              <a:cs typeface="Arial"/>
-              <a:sym typeface="Arial"/>
-            </a:endParaRPr>
-          </a:p>
-        </p:txBody>
-      </p:sp>
-      <p:sp>
-        <p:nvSpPr>
-          <p:cNvPr id="76" name="Google Shape;76;p1"/>
-          <p:cNvSpPr/>
-          <p:nvPr/>
-        </p:nvSpPr>
-        <p:spPr>
-          <a:xfrm>
-            <a:off x="14757535" y="36994439"/>
-            <a:ext cx="13319640" cy="1321985"/>
-          </a:xfrm>
-          <a:prstGeom prst="rect">
-            <a:avLst/>
-          </a:prstGeom>
-          <a:noFill/>
-          <a:ln>
-            <a:noFill/>
-          </a:ln>
-        </p:spPr>
-        <p:txBody>
-          <a:bodyPr anchorCtr="0" anchor="t" bIns="45000" lIns="90000" spcFirstLastPara="1" rIns="90000" wrap="square" tIns="45000">
-            <a:spAutoFit/>
-          </a:bodyPr>
-          <a:lstStyle/>
-          <a:p>
-            <a:pPr indent="0" lvl="0" marL="0" marR="0" rtl="0" algn="just">
-              <a:lnSpc>
-                <a:spcPct val="100000"/>
-              </a:lnSpc>
-              <a:spcBef>
-                <a:spcPts val="0"/>
-              </a:spcBef>
-              <a:spcAft>
-                <a:spcPts val="0"/>
-              </a:spcAft>
-              <a:buNone/>
-            </a:pPr>
-            <a:r>
-              <a:rPr b="0" i="0" lang="pt-BR" sz="4000" u="none" cap="none" strike="noStrike">
-                <a:solidFill>
-                  <a:srgbClr val="000000"/>
-                </a:solidFill>
-                <a:latin typeface="Arial"/>
-                <a:ea typeface="Arial"/>
-                <a:cs typeface="Arial"/>
-                <a:sym typeface="Arial"/>
-              </a:rPr>
-              <a:t>Referências (sem numeração, em ordem alfabética, e seguindo a NBR 6023 – Referências – Elaboração)</a:t>
-            </a:r>
-            <a:endParaRPr b="0" i="0" sz="4000" u="none" cap="none" strike="noStrike">
-              <a:solidFill>
-                <a:schemeClr val="dk1"/>
-              </a:solidFill>
-              <a:latin typeface="Arial"/>
-              <a:ea typeface="Arial"/>
-              <a:cs typeface="Arial"/>
-              <a:sym typeface="Arial"/>
+              <a:latin typeface="Verdana"/>
+              <a:ea typeface="Verdana"/>
+              <a:cs typeface="Verdana"/>
+              <a:sym typeface="Verdana"/>
             </a:endParaRPr>
           </a:p>
         </p:txBody>
@@ -8265,8 +8381,8 @@
         </p:nvSpPr>
         <p:spPr>
           <a:xfrm>
-            <a:off x="395171" y="35258904"/>
-            <a:ext cx="13319640" cy="921876"/>
+            <a:off x="395134" y="33447679"/>
+            <a:ext cx="13319700" cy="921900"/>
           </a:xfrm>
           <a:prstGeom prst="rect">
             <a:avLst/>
@@ -8328,8 +8444,8 @@
         </p:nvSpPr>
         <p:spPr>
           <a:xfrm>
-            <a:off x="491460" y="36704582"/>
-            <a:ext cx="13319640" cy="3168645"/>
+            <a:off x="395125" y="34570900"/>
+            <a:ext cx="13349100" cy="6750900"/>
           </a:xfrm>
           <a:prstGeom prst="rect">
             <a:avLst/>
@@ -8358,25 +8474,57 @@
               <a:buNone/>
             </a:pPr>
             <a:r>
-              <a:rPr b="0" i="0" lang="pt-BR" sz="4000" u="none" cap="none" strike="noStrike">
+              <a:rPr lang="pt-BR" sz="4000">
+                <a:latin typeface="Verdana"/>
+                <a:ea typeface="Verdana"/>
+                <a:cs typeface="Verdana"/>
+                <a:sym typeface="Verdana"/>
+              </a:rPr>
+              <a:t>O desenvolvimento foi subdividido nas seguintes etapas: (i) foi realizada a programação do sensor para obter resposta ao movimento; (ii) foi feito o envio de mensagem para celular por meio do aplicativo Blynk; (iii) foi programado o menu de interação com o usuário com </a:t>
+            </a:r>
+            <a:r>
+              <a:rPr lang="pt-BR" sz="4000">
                 <a:solidFill>
-                  <a:srgbClr val="000000"/>
+                  <a:schemeClr val="dk1"/>
                 </a:solidFill>
-                <a:latin typeface="Arial"/>
-                <a:ea typeface="Arial"/>
-                <a:cs typeface="Arial"/>
-                <a:sym typeface="Arial"/>
+                <a:latin typeface="Verdana"/>
+                <a:ea typeface="Verdana"/>
+                <a:cs typeface="Verdana"/>
+                <a:sym typeface="Verdana"/>
               </a:rPr>
-              <a:t>Os testes foram feitos de forma separada, primeiro foi realizada a parte de programar o sensor e obter a resposta ao movimento. Após isso, foi feita a parte de enviar uma mensagem para o celular por meio do aplicativo blynk. Juntamente com esses processos, </a:t>
+              <a:t>objetivo de cadastrar, alterar e remover senhas cadastradas; (iv) cada etapa anterior foi integrada para se obter o resultado desejado.</a:t>
             </a:r>
-            <a:endParaRPr b="0" i="0" sz="3600" u="none" cap="none" strike="noStrike">
+            <a:endParaRPr>
               <a:solidFill>
                 <a:schemeClr val="dk1"/>
               </a:solidFill>
-              <a:latin typeface="Arial"/>
-              <a:ea typeface="Arial"/>
-              <a:cs typeface="Arial"/>
-              <a:sym typeface="Arial"/>
+              <a:latin typeface="Verdana"/>
+              <a:ea typeface="Verdana"/>
+              <a:cs typeface="Verdana"/>
+              <a:sym typeface="Verdana"/>
+            </a:endParaRPr>
+          </a:p>
+          <a:p>
+            <a:pPr indent="0" lvl="0" marL="0" marR="0" rtl="0" algn="just">
+              <a:lnSpc>
+                <a:spcPct val="100000"/>
+              </a:lnSpc>
+              <a:spcBef>
+                <a:spcPts val="0"/>
+              </a:spcBef>
+              <a:spcAft>
+                <a:spcPts val="0"/>
+              </a:spcAft>
+              <a:buNone/>
+            </a:pPr>
+            <a:r>
+              <a:t/>
+            </a:r>
+            <a:endParaRPr sz="4000">
+              <a:latin typeface="Verdana"/>
+              <a:ea typeface="Verdana"/>
+              <a:cs typeface="Verdana"/>
+              <a:sym typeface="Verdana"/>
             </a:endParaRPr>
           </a:p>
         </p:txBody>
@@ -8389,8 +8537,8 @@
         </p:nvSpPr>
         <p:spPr>
           <a:xfrm>
-            <a:off x="14766265" y="11077621"/>
-            <a:ext cx="13319640" cy="5630857"/>
+            <a:off x="14757500" y="16481999"/>
+            <a:ext cx="13319700" cy="1322100"/>
           </a:xfrm>
           <a:prstGeom prst="rect">
             <a:avLst/>
@@ -8406,52 +8554,37 @@
           </a:bodyPr>
           <a:lstStyle/>
           <a:p>
-            <a:pPr indent="0" lvl="0" marL="0" marR="0" rtl="0" algn="just">
-              <a:spcBef>
-                <a:spcPts val="0"/>
-              </a:spcBef>
-              <a:spcAft>
-                <a:spcPts val="0"/>
-              </a:spcAft>
+            <a:pPr indent="0" lvl="0" marL="0" rtl="0" algn="ctr">
+              <a:spcBef>
+                <a:spcPts val="0"/>
+              </a:spcBef>
+              <a:spcAft>
+                <a:spcPts val="0"/>
+              </a:spcAft>
+              <a:buSzPts val="1100"/>
               <a:buNone/>
             </a:pPr>
             <a:r>
-              <a:rPr b="0" i="0" lang="pt-BR" sz="4000" u="none" cap="none" strike="noStrike">
-                <a:solidFill>
-                  <a:srgbClr val="000000"/>
-                </a:solidFill>
-                <a:latin typeface="Arial"/>
-                <a:ea typeface="Arial"/>
-                <a:cs typeface="Arial"/>
-                <a:sym typeface="Arial"/>
-              </a:rPr>
-              <a:t>foi iniciada a programação do menu de interação com o usuário, com objetivo de cadastrar, alterar e remover</a:t>
-            </a:r>
-            <a:r>
-              <a:rPr b="0" i="0" lang="pt-BR" sz="3600" u="none" cap="none" strike="noStrike">
+              <a:rPr lang="pt-BR" sz="3600">
                 <a:solidFill>
                   <a:schemeClr val="dk1"/>
                 </a:solidFill>
-                <a:latin typeface="Arial"/>
-                <a:ea typeface="Arial"/>
-                <a:cs typeface="Arial"/>
-                <a:sym typeface="Arial"/>
+                <a:latin typeface="Verdana"/>
+                <a:ea typeface="Verdana"/>
+                <a:cs typeface="Verdana"/>
+                <a:sym typeface="Verdana"/>
               </a:rPr>
-              <a:t> </a:t>
+              <a:t>Figura 1 - Diagrama de funcionamento do dispositivo. Fonte: Autores</a:t>
             </a:r>
-            <a:r>
-              <a:rPr b="0" i="0" lang="pt-BR" sz="4000" u="none" cap="none" strike="noStrike">
-                <a:solidFill>
-                  <a:srgbClr val="000000"/>
-                </a:solidFill>
-                <a:latin typeface="Arial"/>
-                <a:ea typeface="Arial"/>
-                <a:cs typeface="Arial"/>
-                <a:sym typeface="Arial"/>
-              </a:rPr>
-              <a:t>senhas cadastradas. Por fim, a atividade final a ser desenvolvida resume-se em integrar cada parte citada para se obter o resultado desejado, pois nos testes a mensagem era enviada logo após a detecção do movimento, e o que desejamos é que o alerta seja feito após um tempo determinado caso não seja inserida a senha.</a:t>
-            </a:r>
-            <a:endParaRPr/>
+            <a:endParaRPr sz="5300">
+              <a:solidFill>
+                <a:schemeClr val="dk1"/>
+              </a:solidFill>
+              <a:latin typeface="Verdana"/>
+              <a:ea typeface="Verdana"/>
+              <a:cs typeface="Verdana"/>
+              <a:sym typeface="Verdana"/>
+            </a:endParaRPr>
           </a:p>
         </p:txBody>
       </p:sp>
@@ -8626,6 +8759,433 @@
           </a:ln>
         </p:spPr>
       </p:pic>
+      <p:sp>
+        <p:nvSpPr>
+          <p:cNvPr id="84" name="Google Shape;84;p1"/>
+          <p:cNvSpPr/>
+          <p:nvPr/>
+        </p:nvSpPr>
+        <p:spPr>
+          <a:xfrm>
+            <a:off x="14766265" y="32147582"/>
+            <a:ext cx="13319700" cy="921900"/>
+          </a:xfrm>
+          <a:prstGeom prst="rect">
+            <a:avLst/>
+          </a:prstGeom>
+          <a:solidFill>
+            <a:srgbClr val="5F497A"/>
+          </a:solidFill>
+          <a:ln>
+            <a:noFill/>
+          </a:ln>
+        </p:spPr>
+        <p:txBody>
+          <a:bodyPr anchorCtr="0" anchor="t" bIns="45000" lIns="90000" spcFirstLastPara="1" rIns="90000" wrap="square" tIns="45000">
+            <a:noAutofit/>
+          </a:bodyPr>
+          <a:lstStyle/>
+          <a:p>
+            <a:pPr indent="0" lvl="0" marL="0" marR="0" rtl="0" algn="ctr">
+              <a:lnSpc>
+                <a:spcPct val="100000"/>
+              </a:lnSpc>
+              <a:spcBef>
+                <a:spcPts val="0"/>
+              </a:spcBef>
+              <a:spcAft>
+                <a:spcPts val="0"/>
+              </a:spcAft>
+              <a:buNone/>
+            </a:pPr>
+            <a:r>
+              <a:rPr b="1" lang="pt-BR" sz="5400">
+                <a:solidFill>
+                  <a:schemeClr val="lt1"/>
+                </a:solidFill>
+              </a:rPr>
+              <a:t>AGRADECIMENTOS</a:t>
+            </a:r>
+            <a:endParaRPr b="0" i="0" sz="5400" u="none" cap="none" strike="noStrike">
+              <a:solidFill>
+                <a:schemeClr val="lt1"/>
+              </a:solidFill>
+              <a:latin typeface="Arial"/>
+              <a:ea typeface="Arial"/>
+              <a:cs typeface="Arial"/>
+              <a:sym typeface="Arial"/>
+            </a:endParaRPr>
+          </a:p>
+        </p:txBody>
+      </p:sp>
+      <p:sp>
+        <p:nvSpPr>
+          <p:cNvPr id="85" name="Google Shape;85;p1"/>
+          <p:cNvSpPr/>
+          <p:nvPr/>
+        </p:nvSpPr>
+        <p:spPr>
+          <a:xfrm>
+            <a:off x="14766275" y="33447665"/>
+            <a:ext cx="13319700" cy="3168600"/>
+          </a:xfrm>
+          <a:prstGeom prst="rect">
+            <a:avLst/>
+          </a:prstGeom>
+          <a:noFill/>
+          <a:ln>
+            <a:noFill/>
+          </a:ln>
+        </p:spPr>
+        <p:txBody>
+          <a:bodyPr anchorCtr="0" anchor="t" bIns="45000" lIns="90000" spcFirstLastPara="1" rIns="90000" wrap="square" tIns="45000">
+            <a:noAutofit/>
+          </a:bodyPr>
+          <a:lstStyle/>
+          <a:p>
+            <a:pPr indent="0" lvl="0" marL="0" rtl="0" algn="just">
+              <a:lnSpc>
+                <a:spcPct val="115000"/>
+              </a:lnSpc>
+              <a:spcBef>
+                <a:spcPts val="0"/>
+              </a:spcBef>
+              <a:spcAft>
+                <a:spcPts val="0"/>
+              </a:spcAft>
+              <a:buClr>
+                <a:schemeClr val="dk1"/>
+              </a:buClr>
+              <a:buSzPts val="1100"/>
+              <a:buFont typeface="Arial"/>
+              <a:buNone/>
+            </a:pPr>
+            <a:r>
+              <a:rPr lang="pt-BR" sz="3900">
+                <a:solidFill>
+                  <a:schemeClr val="dk1"/>
+                </a:solidFill>
+                <a:highlight>
+                  <a:schemeClr val="lt1"/>
+                </a:highlight>
+                <a:latin typeface="Verdana"/>
+                <a:ea typeface="Verdana"/>
+                <a:cs typeface="Verdana"/>
+                <a:sym typeface="Verdana"/>
+              </a:rPr>
+              <a:t>Os autores do trabalho agradecem à DIRGRAD/CEFET-MG pelo suporte à realização do trabalho através do Programa Institucional de Educação Tutorial.</a:t>
+            </a:r>
+            <a:endParaRPr sz="3900">
+              <a:solidFill>
+                <a:schemeClr val="dk1"/>
+              </a:solidFill>
+              <a:latin typeface="Verdana"/>
+              <a:ea typeface="Verdana"/>
+              <a:cs typeface="Verdana"/>
+              <a:sym typeface="Verdana"/>
+            </a:endParaRPr>
+          </a:p>
+          <a:p>
+            <a:pPr indent="0" lvl="0" marL="0" marR="0" rtl="0" algn="just">
+              <a:lnSpc>
+                <a:spcPct val="100000"/>
+              </a:lnSpc>
+              <a:spcBef>
+                <a:spcPts val="0"/>
+              </a:spcBef>
+              <a:spcAft>
+                <a:spcPts val="0"/>
+              </a:spcAft>
+              <a:buNone/>
+            </a:pPr>
+            <a:r>
+              <a:t/>
+            </a:r>
+            <a:endParaRPr sz="4000"/>
+          </a:p>
+        </p:txBody>
+      </p:sp>
+      <p:pic>
+        <p:nvPicPr>
+          <p:cNvPr id="86" name="Google Shape;86;p1"/>
+          <p:cNvPicPr preferRelativeResize="0"/>
+          <p:nvPr/>
+        </p:nvPicPr>
+        <p:blipFill>
+          <a:blip r:embed="rId5">
+            <a:alphaModFix/>
+          </a:blip>
+          <a:stretch>
+            <a:fillRect/>
+          </a:stretch>
+        </p:blipFill>
+        <p:spPr>
+          <a:xfrm>
+            <a:off x="14751525" y="10027251"/>
+            <a:ext cx="13349176" cy="6329114"/>
+          </a:xfrm>
+          <a:prstGeom prst="rect">
+            <a:avLst/>
+          </a:prstGeom>
+          <a:noFill/>
+          <a:ln>
+            <a:noFill/>
+          </a:ln>
+        </p:spPr>
+      </p:pic>
+      <p:pic>
+        <p:nvPicPr>
+          <p:cNvPr id="87" name="Google Shape;87;p1"/>
+          <p:cNvPicPr preferRelativeResize="0"/>
+          <p:nvPr/>
+        </p:nvPicPr>
+        <p:blipFill>
+          <a:blip r:embed="rId6">
+            <a:alphaModFix/>
+          </a:blip>
+          <a:stretch>
+            <a:fillRect/>
+          </a:stretch>
+        </p:blipFill>
+        <p:spPr>
+          <a:xfrm>
+            <a:off x="9697543" y="25173200"/>
+            <a:ext cx="4212808" cy="4158900"/>
+          </a:xfrm>
+          <a:prstGeom prst="rect">
+            <a:avLst/>
+          </a:prstGeom>
+          <a:noFill/>
+          <a:ln>
+            <a:noFill/>
+          </a:ln>
+        </p:spPr>
+      </p:pic>
+      <p:sp>
+        <p:nvSpPr>
+          <p:cNvPr id="88" name="Google Shape;88;p1"/>
+          <p:cNvSpPr/>
+          <p:nvPr/>
+        </p:nvSpPr>
+        <p:spPr>
+          <a:xfrm>
+            <a:off x="576000" y="25179050"/>
+            <a:ext cx="13319700" cy="7896300"/>
+          </a:xfrm>
+          <a:prstGeom prst="rect">
+            <a:avLst/>
+          </a:prstGeom>
+          <a:noFill/>
+          <a:ln>
+            <a:noFill/>
+          </a:ln>
+        </p:spPr>
+        <p:txBody>
+          <a:bodyPr anchorCtr="0" anchor="t" bIns="45000" lIns="90000" spcFirstLastPara="1" rIns="90000" wrap="square" tIns="45000">
+            <a:noAutofit/>
+          </a:bodyPr>
+          <a:lstStyle/>
+          <a:p>
+            <a:pPr indent="0" lvl="0" marL="0" marR="0" rtl="0" algn="just">
+              <a:lnSpc>
+                <a:spcPct val="100000"/>
+              </a:lnSpc>
+              <a:spcBef>
+                <a:spcPts val="0"/>
+              </a:spcBef>
+              <a:spcAft>
+                <a:spcPts val="0"/>
+              </a:spcAft>
+              <a:buNone/>
+            </a:pPr>
+            <a:r>
+              <a:t/>
+            </a:r>
+            <a:endParaRPr sz="4000">
+              <a:latin typeface="Verdana"/>
+              <a:ea typeface="Verdana"/>
+              <a:cs typeface="Verdana"/>
+              <a:sym typeface="Verdana"/>
+            </a:endParaRPr>
+          </a:p>
+          <a:p>
+            <a:pPr indent="0" lvl="0" marL="0" marR="0" rtl="0" algn="just">
+              <a:lnSpc>
+                <a:spcPct val="100000"/>
+              </a:lnSpc>
+              <a:spcBef>
+                <a:spcPts val="0"/>
+              </a:spcBef>
+              <a:spcAft>
+                <a:spcPts val="0"/>
+              </a:spcAft>
+              <a:buNone/>
+            </a:pPr>
+            <a:r>
+              <a:t/>
+            </a:r>
+            <a:endParaRPr sz="4000">
+              <a:latin typeface="Verdana"/>
+              <a:ea typeface="Verdana"/>
+              <a:cs typeface="Verdana"/>
+              <a:sym typeface="Verdana"/>
+            </a:endParaRPr>
+          </a:p>
+          <a:p>
+            <a:pPr indent="0" lvl="0" marL="0" marR="0" rtl="0" algn="just">
+              <a:lnSpc>
+                <a:spcPct val="100000"/>
+              </a:lnSpc>
+              <a:spcBef>
+                <a:spcPts val="0"/>
+              </a:spcBef>
+              <a:spcAft>
+                <a:spcPts val="0"/>
+              </a:spcAft>
+              <a:buNone/>
+            </a:pPr>
+            <a:r>
+              <a:t/>
+            </a:r>
+            <a:endParaRPr sz="4000">
+              <a:latin typeface="Verdana"/>
+              <a:ea typeface="Verdana"/>
+              <a:cs typeface="Verdana"/>
+              <a:sym typeface="Verdana"/>
+            </a:endParaRPr>
+          </a:p>
+          <a:p>
+            <a:pPr indent="0" lvl="0" marL="0" marR="0" rtl="0" algn="just">
+              <a:lnSpc>
+                <a:spcPct val="100000"/>
+              </a:lnSpc>
+              <a:spcBef>
+                <a:spcPts val="0"/>
+              </a:spcBef>
+              <a:spcAft>
+                <a:spcPts val="0"/>
+              </a:spcAft>
+              <a:buNone/>
+            </a:pPr>
+            <a:r>
+              <a:t/>
+            </a:r>
+            <a:endParaRPr sz="4000">
+              <a:latin typeface="Verdana"/>
+              <a:ea typeface="Verdana"/>
+              <a:cs typeface="Verdana"/>
+              <a:sym typeface="Verdana"/>
+            </a:endParaRPr>
+          </a:p>
+          <a:p>
+            <a:pPr indent="0" lvl="0" marL="0" marR="0" rtl="0" algn="just">
+              <a:lnSpc>
+                <a:spcPct val="100000"/>
+              </a:lnSpc>
+              <a:spcBef>
+                <a:spcPts val="0"/>
+              </a:spcBef>
+              <a:spcAft>
+                <a:spcPts val="0"/>
+              </a:spcAft>
+              <a:buNone/>
+            </a:pPr>
+            <a:r>
+              <a:t/>
+            </a:r>
+            <a:endParaRPr sz="4000">
+              <a:latin typeface="Verdana"/>
+              <a:ea typeface="Verdana"/>
+              <a:cs typeface="Verdana"/>
+              <a:sym typeface="Verdana"/>
+            </a:endParaRPr>
+          </a:p>
+          <a:p>
+            <a:pPr indent="0" lvl="0" marL="0" marR="0" rtl="0" algn="just">
+              <a:lnSpc>
+                <a:spcPct val="100000"/>
+              </a:lnSpc>
+              <a:spcBef>
+                <a:spcPts val="0"/>
+              </a:spcBef>
+              <a:spcAft>
+                <a:spcPts val="0"/>
+              </a:spcAft>
+              <a:buNone/>
+            </a:pPr>
+            <a:r>
+              <a:t/>
+            </a:r>
+            <a:endParaRPr sz="4000">
+              <a:latin typeface="Verdana"/>
+              <a:ea typeface="Verdana"/>
+              <a:cs typeface="Verdana"/>
+              <a:sym typeface="Verdana"/>
+            </a:endParaRPr>
+          </a:p>
+          <a:p>
+            <a:pPr indent="0" lvl="0" marL="0" marR="0" rtl="0" algn="just">
+              <a:lnSpc>
+                <a:spcPct val="100000"/>
+              </a:lnSpc>
+              <a:spcBef>
+                <a:spcPts val="0"/>
+              </a:spcBef>
+              <a:spcAft>
+                <a:spcPts val="0"/>
+              </a:spcAft>
+              <a:buNone/>
+            </a:pPr>
+            <a:r>
+              <a:t/>
+            </a:r>
+            <a:endParaRPr sz="4000">
+              <a:latin typeface="Verdana"/>
+              <a:ea typeface="Verdana"/>
+              <a:cs typeface="Verdana"/>
+              <a:sym typeface="Verdana"/>
+            </a:endParaRPr>
+          </a:p>
+          <a:p>
+            <a:pPr indent="0" lvl="0" marL="0" marR="0" rtl="0" algn="just">
+              <a:lnSpc>
+                <a:spcPct val="100000"/>
+              </a:lnSpc>
+              <a:spcBef>
+                <a:spcPts val="0"/>
+              </a:spcBef>
+              <a:spcAft>
+                <a:spcPts val="0"/>
+              </a:spcAft>
+              <a:buNone/>
+            </a:pPr>
+            <a:r>
+              <a:rPr lang="pt-BR" sz="4000">
+                <a:latin typeface="Verdana"/>
+                <a:ea typeface="Verdana"/>
+                <a:cs typeface="Verdana"/>
+                <a:sym typeface="Verdana"/>
+              </a:rPr>
+              <a:t>pessoa </a:t>
+            </a:r>
+            <a:r>
+              <a:rPr lang="pt-BR" sz="4000">
+                <a:latin typeface="Verdana"/>
+                <a:ea typeface="Verdana"/>
+                <a:cs typeface="Verdana"/>
+                <a:sym typeface="Verdana"/>
+              </a:rPr>
+              <a:t>que disparou o evento não digitar a senha após um intervalo de tempo pré-configurado, ou mesmo tentar uma senha errada por três vezes, o sistema dispara o alarme e envia um alerta para o celular do proprietário através do aplicativo Blynk. Se a senha estiver correta, apenas informa sobre a presença da pessoa, sem ativar o alarme.</a:t>
+            </a:r>
+            <a:endParaRPr sz="4000">
+              <a:latin typeface="Verdana"/>
+              <a:ea typeface="Verdana"/>
+              <a:cs typeface="Verdana"/>
+              <a:sym typeface="Verdana"/>
+            </a:endParaRPr>
+          </a:p>
+        </p:txBody>
+      </p:sp>
     </p:spTree>
   </p:cSld>
   <p:clrMapOvr>
@@ -8635,6 +9195,285 @@
 </file>
 
 <file path=ppt/theme/theme1.xml><?xml version="1.0" encoding="utf-8"?>
+<a:theme xmlns:a="http://schemas.openxmlformats.org/drawingml/2006/main" xmlns:r="http://schemas.openxmlformats.org/officeDocument/2006/relationships">
+  <a:themeElements>
+    <a:clrScheme name="Default">
+      <a:dk1>
+        <a:srgbClr val="000000"/>
+      </a:dk1>
+      <a:lt1>
+        <a:srgbClr val="FFFFFF"/>
+      </a:lt1>
+      <a:dk2>
+        <a:srgbClr val="158158"/>
+      </a:dk2>
+      <a:lt2>
+        <a:srgbClr val="F3F3F3"/>
+      </a:lt2>
+      <a:accent1>
+        <a:srgbClr val="058DC7"/>
+      </a:accent1>
+      <a:accent2>
+        <a:srgbClr val="50B432"/>
+      </a:accent2>
+      <a:accent3>
+        <a:srgbClr val="ED561B"/>
+      </a:accent3>
+      <a:accent4>
+        <a:srgbClr val="EDEF00"/>
+      </a:accent4>
+      <a:accent5>
+        <a:srgbClr val="24CBE5"/>
+      </a:accent5>
+      <a:accent6>
+        <a:srgbClr val="64E572"/>
+      </a:accent6>
+      <a:hlink>
+        <a:srgbClr val="2200CC"/>
+      </a:hlink>
+      <a:folHlink>
+        <a:srgbClr val="551A8B"/>
+      </a:folHlink>
+    </a:clrScheme>
+    <a:fontScheme name="Office">
+      <a:majorFont>
+        <a:latin typeface="Arial"/>
+        <a:ea typeface=""/>
+        <a:cs typeface=""/>
+        <a:font script="Jpan" typeface="ＭＳ Ｐゴシック"/>
+        <a:font script="Hang" typeface="맑은 고딕"/>
+        <a:font script="Hans" typeface="宋体"/>
+        <a:font script="Hant" typeface="新細明體"/>
+        <a:font script="Arab" typeface="Times New Roman"/>
+        <a:font script="Hebr" typeface="Times New Roman"/>
+        <a:font script="Thai" typeface="Angsana New"/>
+        <a:font script="Ethi" typeface="Nyala"/>
+        <a:font script="Beng" typeface="Vrinda"/>
+        <a:font script="Gujr" typeface="Shruti"/>
+        <a:font script="Khmr" typeface="MoolBoran"/>
+        <a:font script="Knda" typeface="Tunga"/>
+        <a:font script="Guru" typeface="Raavi"/>
+        <a:font script="Cans" typeface="Euphemia"/>
+        <a:font script="Cher" typeface="Plantagenet Cherokee"/>
+        <a:font script="Yiii" typeface="Microsoft Yi Baiti"/>
+        <a:font script="Tibt" typeface="Microsoft Himalaya"/>
+        <a:font script="Thaa" typeface="MV Boli"/>
+        <a:font script="Deva" typeface="Mangal"/>
+        <a:font script="Telu" typeface="Gautami"/>
+        <a:font script="Taml" typeface="Latha"/>
+        <a:font script="Syrc" typeface="Estrangelo Edessa"/>
+        <a:font script="Orya" typeface="Kalinga"/>
+        <a:font script="Mlym" typeface="Kartika"/>
+        <a:font script="Laoo" typeface="DokChampa"/>
+        <a:font script="Sinh" typeface="Iskoola Pota"/>
+        <a:font script="Mong" typeface="Mongolian Baiti"/>
+        <a:font script="Viet" typeface="Times New Roman"/>
+        <a:font script="Uigh" typeface="Microsoft Uighur"/>
+        <a:font script="Geor" typeface="Sylfaen"/>
+      </a:majorFont>
+      <a:minorFont>
+        <a:latin typeface="Arial"/>
+        <a:ea typeface=""/>
+        <a:cs typeface=""/>
+        <a:font script="Jpan" typeface="ＭＳ Ｐゴシック"/>
+        <a:font script="Hang" typeface="맑은 고딕"/>
+        <a:font script="Hans" typeface="宋体"/>
+        <a:font script="Hant" typeface="新細明體"/>
+        <a:font script="Arab" typeface="Arial"/>
+        <a:font script="Hebr" typeface="Arial"/>
+        <a:font script="Thai" typeface="Cordia New"/>
+        <a:font script="Ethi" typeface="Nyala"/>
+        <a:font script="Beng" typeface="Vrinda"/>
+        <a:font script="Gujr" typeface="Shruti"/>
+        <a:font script="Khmr" typeface="DaunPenh"/>
+        <a:font script="Knda" typeface="Tunga"/>
+        <a:font script="Guru" typeface="Raavi"/>
+        <a:font script="Cans" typeface="Euphemia"/>
+        <a:font script="Cher" typeface="Plantagenet Cherokee"/>
+        <a:font script="Yiii" typeface="Microsoft Yi Baiti"/>
+        <a:font script="Tibt" typeface="Microsoft Himalaya"/>
+        <a:font script="Thaa" typeface="MV Boli"/>
+        <a:font script="Deva" typeface="Mangal"/>
+        <a:font script="Telu" typeface="Gautami"/>
+        <a:font script="Taml" typeface="Latha"/>
+        <a:font script="Syrc" typeface="Estrangelo Edessa"/>
+        <a:font script="Orya" typeface="Kalinga"/>
+        <a:font script="Mlym" typeface="Kartika"/>
+        <a:font script="Laoo" typeface="DokChampa"/>
+        <a:font script="Sinh" typeface="Iskoola Pota"/>
+        <a:font script="Mong" typeface="Mongolian Baiti"/>
+        <a:font script="Viet" typeface="Arial"/>
+        <a:font script="Uigh" typeface="Microsoft Uighur"/>
+        <a:font script="Geor" typeface="Sylfaen"/>
+      </a:minorFont>
+    </a:fontScheme>
+    <a:fmtScheme name="Office">
+      <a:fillStyleLst>
+        <a:solidFill>
+          <a:schemeClr val="phClr"/>
+        </a:solidFill>
+        <a:gradFill rotWithShape="1">
+          <a:gsLst>
+            <a:gs pos="0">
+              <a:schemeClr val="phClr">
+                <a:tint val="50000"/>
+                <a:satMod val="300000"/>
+              </a:schemeClr>
+            </a:gs>
+            <a:gs pos="35000">
+              <a:schemeClr val="phClr">
+                <a:tint val="37000"/>
+                <a:satMod val="300000"/>
+              </a:schemeClr>
+            </a:gs>
+            <a:gs pos="100000">
+              <a:schemeClr val="phClr">
+                <a:tint val="15000"/>
+                <a:satMod val="350000"/>
+              </a:schemeClr>
+            </a:gs>
+          </a:gsLst>
+          <a:lin ang="16200000" scaled="1"/>
+        </a:gradFill>
+        <a:gradFill rotWithShape="1">
+          <a:gsLst>
+            <a:gs pos="0">
+              <a:schemeClr val="phClr">
+                <a:tint val="100000"/>
+                <a:shade val="100000"/>
+                <a:satMod val="130000"/>
+              </a:schemeClr>
+            </a:gs>
+            <a:gs pos="100000">
+              <a:schemeClr val="phClr">
+                <a:tint val="50000"/>
+                <a:shade val="100000"/>
+                <a:satMod val="350000"/>
+              </a:schemeClr>
+            </a:gs>
+          </a:gsLst>
+          <a:lin ang="16200000" scaled="0"/>
+        </a:gradFill>
+      </a:fillStyleLst>
+      <a:lnStyleLst>
+        <a:ln w="9525" cap="flat" cmpd="sng" algn="ctr">
+          <a:solidFill>
+            <a:schemeClr val="phClr">
+              <a:shade val="95000"/>
+              <a:satMod val="105000"/>
+            </a:schemeClr>
+          </a:solidFill>
+          <a:prstDash val="solid"/>
+        </a:ln>
+        <a:ln w="25400" cap="flat" cmpd="sng" algn="ctr">
+          <a:solidFill>
+            <a:schemeClr val="phClr"/>
+          </a:solidFill>
+          <a:prstDash val="solid"/>
+        </a:ln>
+        <a:ln w="38100" cap="flat" cmpd="sng" algn="ctr">
+          <a:solidFill>
+            <a:schemeClr val="phClr"/>
+          </a:solidFill>
+          <a:prstDash val="solid"/>
+        </a:ln>
+      </a:lnStyleLst>
+      <a:effectStyleLst>
+        <a:effectStyle>
+          <a:effectLst>
+            <a:outerShdw blurRad="40000" dist="20000" dir="5400000" rotWithShape="0">
+              <a:srgbClr val="000000">
+                <a:alpha val="38000"/>
+              </a:srgbClr>
+            </a:outerShdw>
+          </a:effectLst>
+        </a:effectStyle>
+        <a:effectStyle>
+          <a:effectLst>
+            <a:outerShdw blurRad="40000" dist="23000" dir="5400000" rotWithShape="0">
+              <a:srgbClr val="000000">
+                <a:alpha val="35000"/>
+              </a:srgbClr>
+            </a:outerShdw>
+          </a:effectLst>
+        </a:effectStyle>
+        <a:effectStyle>
+          <a:effectLst>
+            <a:outerShdw blurRad="40000" dist="23000" dir="5400000" rotWithShape="0">
+              <a:srgbClr val="000000">
+                <a:alpha val="35000"/>
+              </a:srgbClr>
+            </a:outerShdw>
+          </a:effectLst>
+          <a:scene3d>
+            <a:camera prst="orthographicFront">
+              <a:rot lat="0" lon="0" rev="0"/>
+            </a:camera>
+            <a:lightRig rig="threePt" dir="t">
+              <a:rot lat="0" lon="0" rev="1200000"/>
+            </a:lightRig>
+          </a:scene3d>
+          <a:sp3d>
+            <a:bevelT w="63500" h="25400"/>
+          </a:sp3d>
+        </a:effectStyle>
+      </a:effectStyleLst>
+      <a:bgFillStyleLst>
+        <a:solidFill>
+          <a:schemeClr val="phClr"/>
+        </a:solidFill>
+        <a:gradFill rotWithShape="1">
+          <a:gsLst>
+            <a:gs pos="0">
+              <a:schemeClr val="phClr">
+                <a:tint val="40000"/>
+                <a:satMod val="350000"/>
+              </a:schemeClr>
+            </a:gs>
+            <a:gs pos="40000">
+              <a:schemeClr val="phClr">
+                <a:tint val="45000"/>
+                <a:shade val="99000"/>
+                <a:satMod val="350000"/>
+              </a:schemeClr>
+            </a:gs>
+            <a:gs pos="100000">
+              <a:schemeClr val="phClr">
+                <a:shade val="20000"/>
+                <a:satMod val="255000"/>
+              </a:schemeClr>
+            </a:gs>
+          </a:gsLst>
+          <a:path path="circle">
+            <a:fillToRect l="50000" t="-80000" r="50000" b="180000"/>
+          </a:path>
+        </a:gradFill>
+        <a:gradFill rotWithShape="1">
+          <a:gsLst>
+            <a:gs pos="0">
+              <a:schemeClr val="phClr">
+                <a:tint val="80000"/>
+                <a:satMod val="300000"/>
+              </a:schemeClr>
+            </a:gs>
+            <a:gs pos="100000">
+              <a:schemeClr val="phClr">
+                <a:shade val="30000"/>
+                <a:satMod val="200000"/>
+              </a:schemeClr>
+            </a:gs>
+          </a:gsLst>
+          <a:path path="circle">
+            <a:fillToRect l="50000" t="50000" r="50000" b="50000"/>
+          </a:path>
+        </a:gradFill>
+      </a:bgFillStyleLst>
+    </a:fmtScheme>
+  </a:themeElements>
+</a:theme>
+</file>
+
+<file path=ppt/theme/theme2.xml><?xml version="1.0" encoding="utf-8"?>
 <a:theme xmlns:a="http://schemas.openxmlformats.org/drawingml/2006/main" xmlns:r="http://schemas.openxmlformats.org/officeDocument/2006/relationships" name="Office Theme">
   <a:themeElements>
     <a:clrScheme name="Office">
@@ -8911,283 +9750,4 @@
     </a:fmtScheme>
   </a:themeElements>
 </a:theme>
-</file>
-
-<file path=ppt/theme/theme2.xml><?xml version="1.0" encoding="utf-8"?>
-<a:theme xmlns:a="http://schemas.openxmlformats.org/drawingml/2006/main" xmlns:r="http://schemas.openxmlformats.org/officeDocument/2006/relationships">
-  <a:themeElements>
-    <a:clrScheme name="Default">
-      <a:dk1>
-        <a:srgbClr val="000000"/>
-      </a:dk1>
-      <a:lt1>
-        <a:srgbClr val="FFFFFF"/>
-      </a:lt1>
-      <a:dk2>
-        <a:srgbClr val="158158"/>
-      </a:dk2>
-      <a:lt2>
-        <a:srgbClr val="F3F3F3"/>
-      </a:lt2>
-      <a:accent1>
-        <a:srgbClr val="058DC7"/>
-      </a:accent1>
-      <a:accent2>
-        <a:srgbClr val="50B432"/>
-      </a:accent2>
-      <a:accent3>
-        <a:srgbClr val="ED561B"/>
-      </a:accent3>
-      <a:accent4>
-        <a:srgbClr val="EDEF00"/>
-      </a:accent4>
-      <a:accent5>
-        <a:srgbClr val="24CBE5"/>
-      </a:accent5>
-      <a:accent6>
-        <a:srgbClr val="64E572"/>
-      </a:accent6>
-      <a:hlink>
-        <a:srgbClr val="2200CC"/>
-      </a:hlink>
-      <a:folHlink>
-        <a:srgbClr val="551A8B"/>
-      </a:folHlink>
-    </a:clrScheme>
-    <a:fontScheme name="Office">
-      <a:majorFont>
-        <a:latin typeface="Arial"/>
-        <a:ea typeface=""/>
-        <a:cs typeface=""/>
-        <a:font script="Jpan" typeface="ＭＳ Ｐゴシック"/>
-        <a:font script="Hang" typeface="맑은 고딕"/>
-        <a:font script="Hans" typeface="宋体"/>
-        <a:font script="Hant" typeface="新細明體"/>
-        <a:font script="Arab" typeface="Times New Roman"/>
-        <a:font script="Hebr" typeface="Times New Roman"/>
-        <a:font script="Thai" typeface="Angsana New"/>
-        <a:font script="Ethi" typeface="Nyala"/>
-        <a:font script="Beng" typeface="Vrinda"/>
-        <a:font script="Gujr" typeface="Shruti"/>
-        <a:font script="Khmr" typeface="MoolBoran"/>
-        <a:font script="Knda" typeface="Tunga"/>
-        <a:font script="Guru" typeface="Raavi"/>
-        <a:font script="Cans" typeface="Euphemia"/>
-        <a:font script="Cher" typeface="Plantagenet Cherokee"/>
-        <a:font script="Yiii" typeface="Microsoft Yi Baiti"/>
-        <a:font script="Tibt" typeface="Microsoft Himalaya"/>
-        <a:font script="Thaa" typeface="MV Boli"/>
-        <a:font script="Deva" typeface="Mangal"/>
-        <a:font script="Telu" typeface="Gautami"/>
-        <a:font script="Taml" typeface="Latha"/>
-        <a:font script="Syrc" typeface="Estrangelo Edessa"/>
-        <a:font script="Orya" typeface="Kalinga"/>
-        <a:font script="Mlym" typeface="Kartika"/>
-        <a:font script="Laoo" typeface="DokChampa"/>
-        <a:font script="Sinh" typeface="Iskoola Pota"/>
-        <a:font script="Mong" typeface="Mongolian Baiti"/>
-        <a:font script="Viet" typeface="Times New Roman"/>
-        <a:font script="Uigh" typeface="Microsoft Uighur"/>
-        <a:font script="Geor" typeface="Sylfaen"/>
-      </a:majorFont>
-      <a:minorFont>
-        <a:latin typeface="Arial"/>
-        <a:ea typeface=""/>
-        <a:cs typeface=""/>
-        <a:font script="Jpan" typeface="ＭＳ Ｐゴシック"/>
-        <a:font script="Hang" typeface="맑은 고딕"/>
-        <a:font script="Hans" typeface="宋体"/>
-        <a:font script="Hant" typeface="新細明體"/>
-        <a:font script="Arab" typeface="Arial"/>
-        <a:font script="Hebr" typeface="Arial"/>
-        <a:font script="Thai" typeface="Cordia New"/>
-        <a:font script="Ethi" typeface="Nyala"/>
-        <a:font script="Beng" typeface="Vrinda"/>
-        <a:font script="Gujr" typeface="Shruti"/>
-        <a:font script="Khmr" typeface="DaunPenh"/>
-        <a:font script="Knda" typeface="Tunga"/>
-        <a:font script="Guru" typeface="Raavi"/>
-        <a:font script="Cans" typeface="Euphemia"/>
-        <a:font script="Cher" typeface="Plantagenet Cherokee"/>
-        <a:font script="Yiii" typeface="Microsoft Yi Baiti"/>
-        <a:font script="Tibt" typeface="Microsoft Himalaya"/>
-        <a:font script="Thaa" typeface="MV Boli"/>
-        <a:font script="Deva" typeface="Mangal"/>
-        <a:font script="Telu" typeface="Gautami"/>
-        <a:font script="Taml" typeface="Latha"/>
-        <a:font script="Syrc" typeface="Estrangelo Edessa"/>
-        <a:font script="Orya" typeface="Kalinga"/>
-        <a:font script="Mlym" typeface="Kartika"/>
-        <a:font script="Laoo" typeface="DokChampa"/>
-        <a:font script="Sinh" typeface="Iskoola Pota"/>
-        <a:font script="Mong" typeface="Mongolian Baiti"/>
-        <a:font script="Viet" typeface="Arial"/>
-        <a:font script="Uigh" typeface="Microsoft Uighur"/>
-        <a:font script="Geor" typeface="Sylfaen"/>
-      </a:minorFont>
-    </a:fontScheme>
-    <a:fmtScheme name="Office">
-      <a:fillStyleLst>
-        <a:solidFill>
-          <a:schemeClr val="phClr"/>
-        </a:solidFill>
-        <a:gradFill rotWithShape="1">
-          <a:gsLst>
-            <a:gs pos="0">
-              <a:schemeClr val="phClr">
-                <a:tint val="50000"/>
-                <a:satMod val="300000"/>
-              </a:schemeClr>
-            </a:gs>
-            <a:gs pos="35000">
-              <a:schemeClr val="phClr">
-                <a:tint val="37000"/>
-                <a:satMod val="300000"/>
-              </a:schemeClr>
-            </a:gs>
-            <a:gs pos="100000">
-              <a:schemeClr val="phClr">
-                <a:tint val="15000"/>
-                <a:satMod val="350000"/>
-              </a:schemeClr>
-            </a:gs>
-          </a:gsLst>
-          <a:lin ang="16200000" scaled="1"/>
-        </a:gradFill>
-        <a:gradFill rotWithShape="1">
-          <a:gsLst>
-            <a:gs pos="0">
-              <a:schemeClr val="phClr">
-                <a:tint val="100000"/>
-                <a:shade val="100000"/>
-                <a:satMod val="130000"/>
-              </a:schemeClr>
-            </a:gs>
-            <a:gs pos="100000">
-              <a:schemeClr val="phClr">
-                <a:tint val="50000"/>
-                <a:shade val="100000"/>
-                <a:satMod val="350000"/>
-              </a:schemeClr>
-            </a:gs>
-          </a:gsLst>
-          <a:lin ang="16200000" scaled="0"/>
-        </a:gradFill>
-      </a:fillStyleLst>
-      <a:lnStyleLst>
-        <a:ln w="9525" cap="flat" cmpd="sng" algn="ctr">
-          <a:solidFill>
-            <a:schemeClr val="phClr">
-              <a:shade val="95000"/>
-              <a:satMod val="105000"/>
-            </a:schemeClr>
-          </a:solidFill>
-          <a:prstDash val="solid"/>
-        </a:ln>
-        <a:ln w="25400" cap="flat" cmpd="sng" algn="ctr">
-          <a:solidFill>
-            <a:schemeClr val="phClr"/>
-          </a:solidFill>
-          <a:prstDash val="solid"/>
-        </a:ln>
-        <a:ln w="38100" cap="flat" cmpd="sng" algn="ctr">
-          <a:solidFill>
-            <a:schemeClr val="phClr"/>
-          </a:solidFill>
-          <a:prstDash val="solid"/>
-        </a:ln>
-      </a:lnStyleLst>
-      <a:effectStyleLst>
-        <a:effectStyle>
-          <a:effectLst>
-            <a:outerShdw blurRad="40000" dist="20000" dir="5400000" rotWithShape="0">
-              <a:srgbClr val="000000">
-                <a:alpha val="38000"/>
-              </a:srgbClr>
-            </a:outerShdw>
-          </a:effectLst>
-        </a:effectStyle>
-        <a:effectStyle>
-          <a:effectLst>
-            <a:outerShdw blurRad="40000" dist="23000" dir="5400000" rotWithShape="0">
-              <a:srgbClr val="000000">
-                <a:alpha val="35000"/>
-              </a:srgbClr>
-            </a:outerShdw>
-          </a:effectLst>
-        </a:effectStyle>
-        <a:effectStyle>
-          <a:effectLst>
-            <a:outerShdw blurRad="40000" dist="23000" dir="5400000" rotWithShape="0">
-              <a:srgbClr val="000000">
-                <a:alpha val="35000"/>
-              </a:srgbClr>
-            </a:outerShdw>
-          </a:effectLst>
-          <a:scene3d>
-            <a:camera prst="orthographicFront">
-              <a:rot lat="0" lon="0" rev="0"/>
-            </a:camera>
-            <a:lightRig rig="threePt" dir="t">
-              <a:rot lat="0" lon="0" rev="1200000"/>
-            </a:lightRig>
-          </a:scene3d>
-          <a:sp3d>
-            <a:bevelT w="63500" h="25400"/>
-          </a:sp3d>
-        </a:effectStyle>
-      </a:effectStyleLst>
-      <a:bgFillStyleLst>
-        <a:solidFill>
-          <a:schemeClr val="phClr"/>
-        </a:solidFill>
-        <a:gradFill rotWithShape="1">
-          <a:gsLst>
-            <a:gs pos="0">
-              <a:schemeClr val="phClr">
-                <a:tint val="40000"/>
-                <a:satMod val="350000"/>
-              </a:schemeClr>
-            </a:gs>
-            <a:gs pos="40000">
-              <a:schemeClr val="phClr">
-                <a:tint val="45000"/>
-                <a:shade val="99000"/>
-                <a:satMod val="350000"/>
-              </a:schemeClr>
-            </a:gs>
-            <a:gs pos="100000">
-              <a:schemeClr val="phClr">
-                <a:shade val="20000"/>
-                <a:satMod val="255000"/>
-              </a:schemeClr>
-            </a:gs>
-          </a:gsLst>
-          <a:path path="circle">
-            <a:fillToRect l="50000" t="-80000" r="50000" b="180000"/>
-          </a:path>
-        </a:gradFill>
-        <a:gradFill rotWithShape="1">
-          <a:gsLst>
-            <a:gs pos="0">
-              <a:schemeClr val="phClr">
-                <a:tint val="80000"/>
-                <a:satMod val="300000"/>
-              </a:schemeClr>
-            </a:gs>
-            <a:gs pos="100000">
-              <a:schemeClr val="phClr">
-                <a:shade val="30000"/>
-                <a:satMod val="200000"/>
-              </a:schemeClr>
-            </a:gs>
-          </a:gsLst>
-          <a:path path="circle">
-            <a:fillToRect l="50000" t="50000" r="50000" b="50000"/>
-          </a:path>
-        </a:gradFill>
-      </a:bgFillStyleLst>
-    </a:fmtScheme>
-  </a:themeElements>
-</a:theme>
 </file>
</xml_diff>